<commit_message>
Fixed typo on P/NP slide
</commit_message>
<xml_diff>
--- a/Wilson_Capstone_Presentation_2019.pptx
+++ b/Wilson_Capstone_Presentation_2019.pptx
@@ -6364,7 +6364,7 @@
           <a:p>
             <a:fld id="{2B4DA1EB-D5F4-44A7-88E4-C203679A14D0}" type="datetimeFigureOut">
               <a:rPr lang="en-US" smtClean="0"/>
-              <a:t>4/7/2019</a:t>
+              <a:t>4/20/2019</a:t>
             </a:fld>
             <a:endParaRPr lang="en-US"/>
           </a:p>
@@ -6868,7 +6868,7 @@
           <a:p>
             <a:fld id="{8A087FDD-C252-4112-8EFB-AFA44A206892}" type="datetimeFigureOut">
               <a:rPr lang="en-US" smtClean="0"/>
-              <a:t>4/7/2019</a:t>
+              <a:t>4/20/2019</a:t>
             </a:fld>
             <a:endParaRPr lang="en-US"/>
           </a:p>
@@ -7066,7 +7066,7 @@
           <a:p>
             <a:fld id="{8A087FDD-C252-4112-8EFB-AFA44A206892}" type="datetimeFigureOut">
               <a:rPr lang="en-US" smtClean="0"/>
-              <a:t>4/7/2019</a:t>
+              <a:t>4/20/2019</a:t>
             </a:fld>
             <a:endParaRPr lang="en-US"/>
           </a:p>
@@ -7274,7 +7274,7 @@
           <a:p>
             <a:fld id="{8A087FDD-C252-4112-8EFB-AFA44A206892}" type="datetimeFigureOut">
               <a:rPr lang="en-US" smtClean="0"/>
-              <a:t>4/7/2019</a:t>
+              <a:t>4/20/2019</a:t>
             </a:fld>
             <a:endParaRPr lang="en-US"/>
           </a:p>
@@ -7472,7 +7472,7 @@
           <a:p>
             <a:fld id="{8A087FDD-C252-4112-8EFB-AFA44A206892}" type="datetimeFigureOut">
               <a:rPr lang="en-US" smtClean="0"/>
-              <a:t>4/7/2019</a:t>
+              <a:t>4/20/2019</a:t>
             </a:fld>
             <a:endParaRPr lang="en-US"/>
           </a:p>
@@ -7747,7 +7747,7 @@
           <a:p>
             <a:fld id="{8A087FDD-C252-4112-8EFB-AFA44A206892}" type="datetimeFigureOut">
               <a:rPr lang="en-US" smtClean="0"/>
-              <a:t>4/7/2019</a:t>
+              <a:t>4/20/2019</a:t>
             </a:fld>
             <a:endParaRPr lang="en-US"/>
           </a:p>
@@ -8012,7 +8012,7 @@
           <a:p>
             <a:fld id="{8A087FDD-C252-4112-8EFB-AFA44A206892}" type="datetimeFigureOut">
               <a:rPr lang="en-US" smtClean="0"/>
-              <a:t>4/7/2019</a:t>
+              <a:t>4/20/2019</a:t>
             </a:fld>
             <a:endParaRPr lang="en-US"/>
           </a:p>
@@ -8424,7 +8424,7 @@
           <a:p>
             <a:fld id="{8A087FDD-C252-4112-8EFB-AFA44A206892}" type="datetimeFigureOut">
               <a:rPr lang="en-US" smtClean="0"/>
-              <a:t>4/7/2019</a:t>
+              <a:t>4/20/2019</a:t>
             </a:fld>
             <a:endParaRPr lang="en-US"/>
           </a:p>
@@ -8565,7 +8565,7 @@
           <a:p>
             <a:fld id="{8A087FDD-C252-4112-8EFB-AFA44A206892}" type="datetimeFigureOut">
               <a:rPr lang="en-US" smtClean="0"/>
-              <a:t>4/7/2019</a:t>
+              <a:t>4/20/2019</a:t>
             </a:fld>
             <a:endParaRPr lang="en-US"/>
           </a:p>
@@ -8678,7 +8678,7 @@
           <a:p>
             <a:fld id="{8A087FDD-C252-4112-8EFB-AFA44A206892}" type="datetimeFigureOut">
               <a:rPr lang="en-US" smtClean="0"/>
-              <a:t>4/7/2019</a:t>
+              <a:t>4/20/2019</a:t>
             </a:fld>
             <a:endParaRPr lang="en-US"/>
           </a:p>
@@ -8989,7 +8989,7 @@
           <a:p>
             <a:fld id="{8A087FDD-C252-4112-8EFB-AFA44A206892}" type="datetimeFigureOut">
               <a:rPr lang="en-US" smtClean="0"/>
-              <a:t>4/7/2019</a:t>
+              <a:t>4/20/2019</a:t>
             </a:fld>
             <a:endParaRPr lang="en-US"/>
           </a:p>
@@ -9277,7 +9277,7 @@
           <a:p>
             <a:fld id="{8A087FDD-C252-4112-8EFB-AFA44A206892}" type="datetimeFigureOut">
               <a:rPr lang="en-US" smtClean="0"/>
-              <a:t>4/7/2019</a:t>
+              <a:t>4/20/2019</a:t>
             </a:fld>
             <a:endParaRPr lang="en-US"/>
           </a:p>
@@ -9518,7 +9518,7 @@
           <a:p>
             <a:fld id="{8A087FDD-C252-4112-8EFB-AFA44A206892}" type="datetimeFigureOut">
               <a:rPr lang="en-US" smtClean="0"/>
-              <a:t>4/7/2019</a:t>
+              <a:t>4/20/2019</a:t>
             </a:fld>
             <a:endParaRPr lang="en-US"/>
           </a:p>
@@ -11711,8 +11711,8 @@
           </a:p>
         </p:txBody>
       </p:sp>
-      <mc:AlternateContent xmlns:mc="http://schemas.openxmlformats.org/markup-compatibility/2006">
-        <mc:Choice xmlns:a14="http://schemas.microsoft.com/office/drawing/2010/main" Requires="a14">
+      <mc:AlternateContent xmlns:mc="http://schemas.openxmlformats.org/markup-compatibility/2006" xmlns:a14="http://schemas.microsoft.com/office/drawing/2010/main">
+        <mc:Choice Requires="a14">
           <p:sp>
             <p:nvSpPr>
               <p:cNvPr id="16" name="Content Placeholder 2">
@@ -12961,7 +12961,7 @@
             </p:txBody>
           </p:sp>
         </mc:Choice>
-        <mc:Fallback>
+        <mc:Fallback xmlns="">
           <p:sp>
             <p:nvSpPr>
               <p:cNvPr id="16" name="Content Placeholder 2">
@@ -17337,8 +17337,8 @@
           </a:p>
         </p:txBody>
       </p:sp>
-      <mc:AlternateContent xmlns:mc="http://schemas.openxmlformats.org/markup-compatibility/2006">
-        <mc:Choice xmlns:a14="http://schemas.microsoft.com/office/drawing/2010/main" Requires="a14">
+      <mc:AlternateContent xmlns:mc="http://schemas.openxmlformats.org/markup-compatibility/2006" xmlns:a14="http://schemas.microsoft.com/office/drawing/2010/main">
+        <mc:Choice Requires="a14">
           <p:sp>
             <p:nvSpPr>
               <p:cNvPr id="3" name="Content Placeholder 2">
@@ -18111,7 +18111,7 @@
             </p:txBody>
           </p:sp>
         </mc:Choice>
-        <mc:Fallback>
+        <mc:Fallback xmlns="">
           <p:sp>
             <p:nvSpPr>
               <p:cNvPr id="3" name="Content Placeholder 2">
@@ -18446,8 +18446,8 @@
           </a:p>
         </p:txBody>
       </p:sp>
-      <mc:AlternateContent xmlns:mc="http://schemas.openxmlformats.org/markup-compatibility/2006" xmlns:a14="http://schemas.microsoft.com/office/drawing/2010/main">
-        <mc:Choice Requires="a14">
+      <mc:AlternateContent xmlns:mc="http://schemas.openxmlformats.org/markup-compatibility/2006">
+        <mc:Choice xmlns:a14="http://schemas.microsoft.com/office/drawing/2010/main" Requires="a14">
           <p:sp>
             <p:nvSpPr>
               <p:cNvPr id="3" name="Content Placeholder 2">
@@ -18499,7 +18499,7 @@
                   </m:oMath>
                 </a14:m>
                 <a:r>
-                  <a:rPr lang="en-US" sz="2000"/>
+                  <a:rPr lang="en-US" sz="2000" dirty="0"/>
                   <a:t> vs </a:t>
                 </a:r>
                 <a14:m>
@@ -18526,50 +18526,50 @@
                     </m:r>
                   </m:oMath>
                 </a14:m>
-                <a:endParaRPr lang="en-US" sz="2000"/>
+                <a:endParaRPr lang="en-US" sz="2000" dirty="0"/>
               </a:p>
               <a:p>
                 <a:r>
-                  <a:rPr lang="en-US" sz="2000" i="1"/>
+                  <a:rPr lang="en-US" sz="2000" i="1" dirty="0"/>
                   <a:t>P</a:t>
                 </a:r>
                 <a:r>
-                  <a:rPr lang="en-US" sz="2000"/>
+                  <a:rPr lang="en-US" sz="2000" dirty="0"/>
                   <a:t> is the set of all problems that can be solved in polynomial time</a:t>
                 </a:r>
               </a:p>
               <a:p>
                 <a:r>
-                  <a:rPr lang="en-US" sz="2000" i="1"/>
+                  <a:rPr lang="en-US" sz="2000" i="1" dirty="0"/>
                   <a:t>NP </a:t>
                 </a:r>
                 <a:r>
-                  <a:rPr lang="en-US" sz="2000"/>
+                  <a:rPr lang="en-US" sz="2000" dirty="0"/>
                   <a:t>is the set of all problems that must be solved in non-deterministic polynomial time </a:t>
+                </a:r>
+              </a:p>
+              <a:p>
+                <a:r>
+                  <a:rPr lang="en-US" sz="2000" i="1" dirty="0"/>
+                  <a:t>NP</a:t>
+                </a:r>
+                <a:r>
+                  <a:rPr lang="en-US" sz="2000" dirty="0"/>
+                  <a:t>-Hard is as difficult as the most difficult </a:t>
+                </a:r>
+                <a:r>
+                  <a:rPr lang="en-US" sz="2000" i="1" dirty="0"/>
+                  <a:t>NP</a:t>
+                </a:r>
+                <a:r>
+                  <a:rPr lang="en-US" sz="2000" dirty="0"/>
+                  <a:t> problem in the set</a:t>
                 </a:r>
               </a:p>
               <a:p>
                 <a:r>
                   <a:rPr lang="en-US" sz="2000" i="1"/>
                   <a:t>NP</a:t>
-                </a:r>
-                <a:r>
-                  <a:rPr lang="en-US" sz="2000"/>
-                  <a:t>-Hard is as difficult as the most difficult </a:t>
-                </a:r>
-                <a:r>
-                  <a:rPr lang="en-US" sz="2000" i="1"/>
-                  <a:t>NP</a:t>
-                </a:r>
-                <a:r>
-                  <a:rPr lang="en-US" sz="2000"/>
-                  <a:t> problem in the set</a:t>
-                </a:r>
-              </a:p>
-              <a:p>
-                <a:r>
-                  <a:rPr lang="en-US" sz="2000" i="1"/>
-                  <a:t>N</a:t>
                 </a:r>
                 <a:r>
                   <a:rPr lang="en-US" sz="2000"/>
@@ -18580,7 +18580,7 @@
             </p:txBody>
           </p:sp>
         </mc:Choice>
-        <mc:Fallback xmlns="">
+        <mc:Fallback>
           <p:sp>
             <p:nvSpPr>
               <p:cNvPr id="3" name="Content Placeholder 2">

</xml_diff>